<commit_message>
Simplify and finalize the tables, column datatypes
</commit_message>
<xml_diff>
--- a/db/schema.pptx
+++ b/db/schema.pptx
@@ -3037,7 +3037,7 @@
       </p:grpSpPr>
       <p:pic>
         <p:nvPicPr>
-          <p:cNvPr id="1030" name="Picture 6"/>
+          <p:cNvPr id="1036" name="Picture 12"/>
           <p:cNvPicPr>
             <a:picLocks noChangeAspect="1" noChangeArrowheads="1"/>
           </p:cNvPicPr>
@@ -3045,15 +3045,15 @@
         </p:nvPicPr>
         <p:blipFill>
           <a:blip r:embed="rId2"/>
-          <a:srcRect b="4380"/>
+          <a:srcRect/>
           <a:stretch>
             <a:fillRect/>
           </a:stretch>
         </p:blipFill>
         <p:spPr bwMode="auto">
           <a:xfrm>
-            <a:off x="-1" y="0"/>
-            <a:ext cx="8305801" cy="6858000"/>
+            <a:off x="0" y="0"/>
+            <a:ext cx="9144000" cy="5840146"/>
           </a:xfrm>
           <a:prstGeom prst="rect">
             <a:avLst/>
@@ -3076,7 +3076,7 @@
         </p:nvSpPr>
         <p:spPr>
           <a:xfrm>
-            <a:off x="3123194" y="3124200"/>
+            <a:off x="3962400" y="4191000"/>
             <a:ext cx="1306768" cy="707886"/>
           </a:xfrm>
           <a:prstGeom prst="rect">
@@ -3153,13 +3153,15 @@
       <p:cxnSp>
         <p:nvCxnSpPr>
           <p:cNvPr id="16" name="Straight Arrow Connector 15"/>
-          <p:cNvCxnSpPr/>
+          <p:cNvCxnSpPr>
+            <a:endCxn id="15" idx="0"/>
+          </p:cNvCxnSpPr>
           <p:nvPr/>
         </p:nvCxnSpPr>
         <p:spPr>
-          <a:xfrm rot="16200000" flipH="1">
-            <a:off x="3733802" y="2971801"/>
-            <a:ext cx="228599" cy="76198"/>
+          <a:xfrm rot="5400000">
+            <a:off x="4250992" y="1964992"/>
+            <a:ext cx="2590800" cy="1861216"/>
           </a:xfrm>
           <a:prstGeom prst="straightConnector1">
             <a:avLst/>
@@ -3191,7 +3193,7 @@
         </p:nvSpPr>
         <p:spPr>
           <a:xfrm>
-            <a:off x="228600" y="4038600"/>
+            <a:off x="228600" y="3242846"/>
             <a:ext cx="1306768" cy="338554"/>
           </a:xfrm>
           <a:prstGeom prst="rect">
@@ -3228,15 +3230,13 @@
       <p:cxnSp>
         <p:nvCxnSpPr>
           <p:cNvPr id="23" name="Straight Arrow Connector 22"/>
-          <p:cNvCxnSpPr>
-            <a:endCxn id="22" idx="0"/>
-          </p:cNvCxnSpPr>
+          <p:cNvCxnSpPr/>
           <p:nvPr/>
         </p:nvCxnSpPr>
         <p:spPr>
           <a:xfrm rot="10800000" flipV="1">
-            <a:off x="881984" y="3886200"/>
-            <a:ext cx="1099216" cy="152400"/>
+            <a:off x="1415384" y="2743199"/>
+            <a:ext cx="1099216" cy="609599"/>
           </a:xfrm>
           <a:prstGeom prst="straightConnector1">
             <a:avLst/>
@@ -3262,13 +3262,110 @@
       </p:cxnSp>
       <p:sp>
         <p:nvSpPr>
-          <p:cNvPr id="31" name="TextBox 30"/>
+          <p:cNvPr id="33" name="TextBox 32"/>
           <p:cNvSpPr txBox="1"/>
           <p:nvPr/>
         </p:nvSpPr>
         <p:spPr>
           <a:xfrm>
-            <a:off x="2005613" y="2667000"/>
+            <a:off x="7391400" y="5370493"/>
+            <a:ext cx="1418978" cy="954107"/>
+          </a:xfrm>
+          <a:prstGeom prst="rect">
+            <a:avLst/>
+          </a:prstGeom>
+          <a:noFill/>
+        </p:spPr>
+        <p:txBody>
+          <a:bodyPr wrap="none" rtlCol="0">
+            <a:spAutoFit/>
+          </a:bodyPr>
+          <a:lstStyle/>
+          <a:p>
+            <a:r>
+              <a:rPr lang="en-US" sz="800" b="1" smtClean="0">
+                <a:latin typeface="Consolas" pitchFamily="49" charset="0"/>
+              </a:rPr>
+              <a:t>stuff borrow_slot: </a:t>
+            </a:r>
+          </a:p>
+          <a:p>
+            <a:r>
+              <a:rPr lang="en-US" sz="800">
+                <a:latin typeface="Consolas" pitchFamily="49" charset="0"/>
+              </a:rPr>
+              <a:t> </a:t>
+            </a:r>
+            <a:r>
+              <a:rPr lang="en-US" sz="800" smtClean="0">
+                <a:latin typeface="Consolas" pitchFamily="49" charset="0"/>
+              </a:rPr>
+              <a:t>-1 = owner</a:t>
+            </a:r>
+          </a:p>
+          <a:p>
+            <a:r>
+              <a:rPr lang="en-US" sz="800" smtClean="0">
+                <a:latin typeface="Consolas" pitchFamily="49" charset="0"/>
+              </a:rPr>
+              <a:t>  1 = available slot 1</a:t>
+            </a:r>
+          </a:p>
+          <a:p>
+            <a:r>
+              <a:rPr lang="en-US" sz="800" smtClean="0">
+                <a:latin typeface="Consolas" pitchFamily="49" charset="0"/>
+              </a:rPr>
+              <a:t>  2 = available slot 2</a:t>
+            </a:r>
+          </a:p>
+          <a:p>
+            <a:r>
+              <a:rPr lang="en-US" sz="800" smtClean="0">
+                <a:latin typeface="Consolas" pitchFamily="49" charset="0"/>
+              </a:rPr>
+              <a:t>  3 = available slot 3</a:t>
+            </a:r>
+          </a:p>
+          <a:p>
+            <a:r>
+              <a:rPr lang="en-US" sz="800">
+                <a:latin typeface="Consolas" pitchFamily="49" charset="0"/>
+              </a:rPr>
+              <a:t> </a:t>
+            </a:r>
+            <a:r>
+              <a:rPr lang="en-US" sz="800" smtClean="0">
+                <a:latin typeface="Consolas" pitchFamily="49" charset="0"/>
+              </a:rPr>
+              <a:t> ...</a:t>
+            </a:r>
+          </a:p>
+          <a:p>
+            <a:r>
+              <a:rPr lang="en-US" sz="800">
+                <a:latin typeface="Consolas" pitchFamily="49" charset="0"/>
+              </a:rPr>
+              <a:t> </a:t>
+            </a:r>
+            <a:r>
+              <a:rPr lang="en-US" sz="800" smtClean="0">
+                <a:latin typeface="Consolas" pitchFamily="49" charset="0"/>
+              </a:rPr>
+              <a:t> n = available slot n</a:t>
+            </a:r>
+          </a:p>
+        </p:txBody>
+      </p:sp>
+      <p:sp>
+        <p:nvSpPr>
+          <p:cNvPr id="35" name="TextBox 34"/>
+          <p:cNvSpPr txBox="1"/>
+          <p:nvPr/>
+        </p:nvSpPr>
+        <p:spPr>
+          <a:xfrm>
+            <a:off x="1752600" y="-838200"/>
             <a:ext cx="889987" cy="246221"/>
           </a:xfrm>
           <a:prstGeom prst="rect">
@@ -3299,108 +3396,13 @@
       </p:sp>
       <p:sp>
         <p:nvSpPr>
-          <p:cNvPr id="33" name="TextBox 32"/>
+          <p:cNvPr id="36" name="TextBox 35"/>
           <p:cNvSpPr txBox="1"/>
           <p:nvPr/>
         </p:nvSpPr>
         <p:spPr>
           <a:xfrm>
-            <a:off x="7695194" y="2474893"/>
-            <a:ext cx="1418978" cy="954107"/>
-          </a:xfrm>
-          <a:prstGeom prst="rect">
-            <a:avLst/>
-          </a:prstGeom>
-          <a:noFill/>
-        </p:spPr>
-        <p:txBody>
-          <a:bodyPr wrap="none" rtlCol="0">
-            <a:spAutoFit/>
-          </a:bodyPr>
-          <a:lstStyle/>
-          <a:p>
-            <a:r>
-              <a:rPr lang="en-US" sz="800" b="1" smtClean="0">
-                <a:latin typeface="Consolas" pitchFamily="49" charset="0"/>
-              </a:rPr>
-              <a:t>equips borrow_slot:</a:t>
-            </a:r>
-          </a:p>
-          <a:p>
-            <a:pPr>
-              <a:buFontTx/>
-              <a:buChar char="-"/>
-            </a:pPr>
-            <a:r>
-              <a:rPr lang="en-US" sz="800" smtClean="0">
-                <a:latin typeface="Consolas" pitchFamily="49" charset="0"/>
-              </a:rPr>
-              <a:t> 1 = owner</a:t>
-            </a:r>
-          </a:p>
-          <a:p>
-            <a:r>
-              <a:rPr lang="en-US" sz="800" smtClean="0">
-                <a:latin typeface="Consolas" pitchFamily="49" charset="0"/>
-              </a:rPr>
-              <a:t>  1 = available slot 1</a:t>
-            </a:r>
-          </a:p>
-          <a:p>
-            <a:r>
-              <a:rPr lang="en-US" sz="800" smtClean="0">
-                <a:latin typeface="Consolas" pitchFamily="49" charset="0"/>
-              </a:rPr>
-              <a:t>  2 = available slot 2</a:t>
-            </a:r>
-          </a:p>
-          <a:p>
-            <a:r>
-              <a:rPr lang="en-US" sz="800" smtClean="0">
-                <a:latin typeface="Consolas" pitchFamily="49" charset="0"/>
-              </a:rPr>
-              <a:t>  3 = available slot 3</a:t>
-            </a:r>
-          </a:p>
-          <a:p>
-            <a:r>
-              <a:rPr lang="en-US" sz="800">
-                <a:latin typeface="Consolas" pitchFamily="49" charset="0"/>
-              </a:rPr>
-              <a:t> </a:t>
-            </a:r>
-            <a:r>
-              <a:rPr lang="en-US" sz="800" smtClean="0">
-                <a:latin typeface="Consolas" pitchFamily="49" charset="0"/>
-              </a:rPr>
-              <a:t> ...</a:t>
-            </a:r>
-          </a:p>
-          <a:p>
-            <a:r>
-              <a:rPr lang="en-US" sz="800">
-                <a:latin typeface="Consolas" pitchFamily="49" charset="0"/>
-              </a:rPr>
-              <a:t> </a:t>
-            </a:r>
-            <a:r>
-              <a:rPr lang="en-US" sz="800" smtClean="0">
-                <a:latin typeface="Consolas" pitchFamily="49" charset="0"/>
-              </a:rPr>
-              <a:t> n = available slot n</a:t>
-            </a:r>
-          </a:p>
-        </p:txBody>
-      </p:sp>
-      <p:sp>
-        <p:nvSpPr>
-          <p:cNvPr id="34" name="TextBox 33"/>
-          <p:cNvSpPr txBox="1"/>
-          <p:nvPr/>
-        </p:nvSpPr>
-        <p:spPr>
-          <a:xfrm>
-            <a:off x="2005613" y="1295400"/>
+            <a:off x="5587013" y="-855821"/>
             <a:ext cx="889987" cy="246221"/>
           </a:xfrm>
           <a:prstGeom prst="rect">
@@ -3429,80 +3431,6 @@
           </a:p>
         </p:txBody>
       </p:sp>
-      <p:sp>
-        <p:nvSpPr>
-          <p:cNvPr id="35" name="TextBox 34"/>
-          <p:cNvSpPr txBox="1"/>
-          <p:nvPr/>
-        </p:nvSpPr>
-        <p:spPr>
-          <a:xfrm>
-            <a:off x="2057400" y="0"/>
-            <a:ext cx="889987" cy="246221"/>
-          </a:xfrm>
-          <a:prstGeom prst="rect">
-            <a:avLst/>
-          </a:prstGeom>
-          <a:noFill/>
-        </p:spPr>
-        <p:txBody>
-          <a:bodyPr wrap="none" rtlCol="0">
-            <a:spAutoFit/>
-          </a:bodyPr>
-          <a:lstStyle/>
-          <a:p>
-            <a:r>
-              <a:rPr lang="en-US" sz="1000" b="1" i="1" smtClean="0">
-                <a:solidFill>
-                  <a:schemeClr val="accent5">
-                    <a:lumMod val="60000"/>
-                    <a:lumOff val="40000"/>
-                  </a:schemeClr>
-                </a:solidFill>
-                <a:latin typeface="Consolas" pitchFamily="49" charset="0"/>
-              </a:rPr>
-              <a:t>join table</a:t>
-            </a:r>
-          </a:p>
-        </p:txBody>
-      </p:sp>
-      <p:sp>
-        <p:nvSpPr>
-          <p:cNvPr id="36" name="TextBox 35"/>
-          <p:cNvSpPr txBox="1"/>
-          <p:nvPr/>
-        </p:nvSpPr>
-        <p:spPr>
-          <a:xfrm>
-            <a:off x="5129813" y="0"/>
-            <a:ext cx="889987" cy="246221"/>
-          </a:xfrm>
-          <a:prstGeom prst="rect">
-            <a:avLst/>
-          </a:prstGeom>
-          <a:noFill/>
-        </p:spPr>
-        <p:txBody>
-          <a:bodyPr wrap="none" rtlCol="0">
-            <a:spAutoFit/>
-          </a:bodyPr>
-          <a:lstStyle/>
-          <a:p>
-            <a:r>
-              <a:rPr lang="en-US" sz="1000" b="1" i="1" smtClean="0">
-                <a:solidFill>
-                  <a:schemeClr val="accent5">
-                    <a:lumMod val="60000"/>
-                    <a:lumOff val="40000"/>
-                  </a:schemeClr>
-                </a:solidFill>
-                <a:latin typeface="Consolas" pitchFamily="49" charset="0"/>
-              </a:rPr>
-              <a:t>join table</a:t>
-            </a:r>
-          </a:p>
-        </p:txBody>
-      </p:sp>
       <p:cxnSp>
         <p:nvCxnSpPr>
           <p:cNvPr id="37" name="Straight Arrow Connector 36"/>
@@ -3510,9 +3438,9 @@
           <p:nvPr/>
         </p:nvCxnSpPr>
         <p:spPr>
-          <a:xfrm>
-            <a:off x="7467600" y="2438401"/>
-            <a:ext cx="228600" cy="152401"/>
+          <a:xfrm rot="16200000" flipH="1">
+            <a:off x="6743700" y="4686300"/>
+            <a:ext cx="1066800" cy="381000"/>
           </a:xfrm>
           <a:prstGeom prst="straightConnector1">
             <a:avLst/>
@@ -3538,14 +3466,14 @@
       </p:cxnSp>
       <p:sp>
         <p:nvSpPr>
-          <p:cNvPr id="43" name="TextBox 42"/>
+          <p:cNvPr id="71" name="TextBox 70"/>
           <p:cNvSpPr txBox="1"/>
           <p:nvPr/>
         </p:nvSpPr>
         <p:spPr>
           <a:xfrm>
-            <a:off x="1929413" y="4478179"/>
-            <a:ext cx="889987" cy="246221"/>
+            <a:off x="4648200" y="5105400"/>
+            <a:ext cx="1250663" cy="707886"/>
           </a:xfrm>
           <a:prstGeom prst="rect">
             <a:avLst/>
@@ -3559,17 +3487,283 @@
           <a:lstStyle/>
           <a:p>
             <a:r>
-              <a:rPr lang="en-US" sz="1000" b="1" i="1" smtClean="0">
+              <a:rPr lang="en-US" sz="800" b="1" smtClean="0">
+                <a:latin typeface="Consolas" pitchFamily="49" charset="0"/>
+              </a:rPr>
+              <a:t>stuff share_status:</a:t>
+            </a:r>
+          </a:p>
+          <a:p>
+            <a:pPr>
+              <a:buFontTx/>
+              <a:buChar char="-"/>
+            </a:pPr>
+            <a:r>
+              <a:rPr lang="en-US" sz="800" smtClean="0">
+                <a:latin typeface="Consolas" pitchFamily="49" charset="0"/>
+              </a:rPr>
+              <a:t> have it</a:t>
+            </a:r>
+          </a:p>
+          <a:p>
+            <a:pPr>
+              <a:buFontTx/>
+              <a:buChar char="-"/>
+            </a:pPr>
+            <a:r>
+              <a:rPr lang="en-US" sz="800">
+                <a:latin typeface="Consolas" pitchFamily="49" charset="0"/>
+              </a:rPr>
+              <a:t> </a:t>
+            </a:r>
+            <a:r>
+              <a:rPr lang="en-US" sz="800" smtClean="0">
+                <a:latin typeface="Consolas" pitchFamily="49" charset="0"/>
+              </a:rPr>
+              <a:t>will buy it</a:t>
+            </a:r>
+          </a:p>
+          <a:p>
+            <a:pPr>
+              <a:buFontTx/>
+              <a:buChar char="-"/>
+            </a:pPr>
+            <a:r>
+              <a:rPr lang="en-US" sz="800" smtClean="0">
+                <a:latin typeface="Consolas" pitchFamily="49" charset="0"/>
+              </a:rPr>
+              <a:t>request to borrow</a:t>
+            </a:r>
+          </a:p>
+          <a:p>
+            <a:pPr>
+              <a:buFontTx/>
+              <a:buChar char="-"/>
+            </a:pPr>
+            <a:r>
+              <a:rPr lang="en-US" sz="800" smtClean="0">
+                <a:latin typeface="Consolas" pitchFamily="49" charset="0"/>
+              </a:rPr>
+              <a:t>request fulfilled</a:t>
+            </a:r>
+            <a:endParaRPr lang="en-US" sz="800">
+              <a:latin typeface="Consolas" pitchFamily="49" charset="0"/>
+            </a:endParaRPr>
+          </a:p>
+        </p:txBody>
+      </p:sp>
+      <p:sp>
+        <p:nvSpPr>
+          <p:cNvPr id="72" name="TextBox 71"/>
+          <p:cNvSpPr txBox="1"/>
+          <p:nvPr/>
+        </p:nvSpPr>
+        <p:spPr>
+          <a:xfrm>
+            <a:off x="8189777" y="224135"/>
+            <a:ext cx="801823" cy="461665"/>
+          </a:xfrm>
+          <a:prstGeom prst="rect">
+            <a:avLst/>
+          </a:prstGeom>
+          <a:noFill/>
+        </p:spPr>
+        <p:txBody>
+          <a:bodyPr wrap="none" rtlCol="0">
+            <a:spAutoFit/>
+          </a:bodyPr>
+          <a:lstStyle/>
+          <a:p>
+            <a:r>
+              <a:rPr lang="en-US" sz="800" b="1" smtClean="0">
+                <a:latin typeface="Consolas" pitchFamily="49" charset="0"/>
+              </a:rPr>
+              <a:t>users role:</a:t>
+            </a:r>
+          </a:p>
+          <a:p>
+            <a:pPr>
+              <a:buFontTx/>
+              <a:buChar char="-"/>
+            </a:pPr>
+            <a:r>
+              <a:rPr lang="en-US" sz="800" smtClean="0">
+                <a:latin typeface="Consolas" pitchFamily="49" charset="0"/>
+              </a:rPr>
+              <a:t> organizer</a:t>
+            </a:r>
+          </a:p>
+          <a:p>
+            <a:pPr>
+              <a:buFontTx/>
+              <a:buChar char="-"/>
+            </a:pPr>
+            <a:r>
+              <a:rPr lang="en-US" sz="800" smtClean="0">
+                <a:latin typeface="Consolas" pitchFamily="49" charset="0"/>
+              </a:rPr>
+              <a:t> member</a:t>
+            </a:r>
+          </a:p>
+        </p:txBody>
+      </p:sp>
+      <p:cxnSp>
+        <p:nvCxnSpPr>
+          <p:cNvPr id="73" name="Straight Arrow Connector 72"/>
+          <p:cNvCxnSpPr/>
+          <p:nvPr/>
+        </p:nvCxnSpPr>
+        <p:spPr>
+          <a:xfrm rot="5400000" flipH="1" flipV="1">
+            <a:off x="7620000" y="533400"/>
+            <a:ext cx="838200" cy="381000"/>
+          </a:xfrm>
+          <a:prstGeom prst="straightConnector1">
+            <a:avLst/>
+          </a:prstGeom>
+          <a:ln>
+            <a:tailEnd type="arrow"/>
+          </a:ln>
+        </p:spPr>
+        <p:style>
+          <a:lnRef idx="1">
+            <a:schemeClr val="accent1"/>
+          </a:lnRef>
+          <a:fillRef idx="0">
+            <a:schemeClr val="accent1"/>
+          </a:fillRef>
+          <a:effectRef idx="0">
+            <a:schemeClr val="accent1"/>
+          </a:effectRef>
+          <a:fontRef idx="minor">
+            <a:schemeClr val="tx1"/>
+          </a:fontRef>
+        </p:style>
+      </p:cxnSp>
+      <p:cxnSp>
+        <p:nvCxnSpPr>
+          <p:cNvPr id="82" name="Straight Arrow Connector 81"/>
+          <p:cNvCxnSpPr>
+            <a:endCxn id="71" idx="0"/>
+          </p:cNvCxnSpPr>
+          <p:nvPr/>
+        </p:nvCxnSpPr>
+        <p:spPr>
+          <a:xfrm rot="5400000">
+            <a:off x="5227566" y="4541766"/>
+            <a:ext cx="609600" cy="517668"/>
+          </a:xfrm>
+          <a:prstGeom prst="straightConnector1">
+            <a:avLst/>
+          </a:prstGeom>
+          <a:ln>
+            <a:tailEnd type="arrow"/>
+          </a:ln>
+        </p:spPr>
+        <p:style>
+          <a:lnRef idx="1">
+            <a:schemeClr val="accent1"/>
+          </a:lnRef>
+          <a:fillRef idx="0">
+            <a:schemeClr val="accent1"/>
+          </a:fillRef>
+          <a:effectRef idx="0">
+            <a:schemeClr val="accent1"/>
+          </a:effectRef>
+          <a:fontRef idx="minor">
+            <a:schemeClr val="tx1"/>
+          </a:fontRef>
+        </p:style>
+      </p:cxnSp>
+      <p:sp>
+        <p:nvSpPr>
+          <p:cNvPr id="92" name="TextBox 91"/>
+          <p:cNvSpPr txBox="1"/>
+          <p:nvPr/>
+        </p:nvSpPr>
+        <p:spPr>
+          <a:xfrm>
+            <a:off x="228600" y="5867400"/>
+            <a:ext cx="3429000" cy="707886"/>
+          </a:xfrm>
+          <a:prstGeom prst="rect">
+            <a:avLst/>
+          </a:prstGeom>
+          <a:noFill/>
+        </p:spPr>
+        <p:txBody>
+          <a:bodyPr wrap="square" rtlCol="0">
+            <a:spAutoFit/>
+          </a:bodyPr>
+          <a:lstStyle/>
+          <a:p>
+            <a:pPr>
+              <a:buFont typeface="Arial" pitchFamily="34" charset="0"/>
+              <a:buChar char="•"/>
+            </a:pPr>
+            <a:r>
+              <a:rPr lang="en-US" sz="800" i="1" smtClean="0">
                 <a:solidFill>
-                  <a:schemeClr val="accent5">
-                    <a:lumMod val="60000"/>
-                    <a:lumOff val="40000"/>
+                  <a:schemeClr val="accent6">
+                    <a:lumMod val="50000"/>
                   </a:schemeClr>
                 </a:solidFill>
                 <a:latin typeface="Consolas" pitchFamily="49" charset="0"/>
               </a:rPr>
-              <a:t>join table</a:t>
-            </a:r>
+              <a:t> tags are strings separated by a pipe symbol “|”</a:t>
+            </a:r>
+          </a:p>
+          <a:p>
+            <a:pPr>
+              <a:buFont typeface="Arial" pitchFamily="34" charset="0"/>
+              <a:buChar char="•"/>
+            </a:pPr>
+            <a:endParaRPr lang="en-US" sz="800" i="1" smtClean="0">
+              <a:solidFill>
+                <a:schemeClr val="accent6">
+                  <a:lumMod val="50000"/>
+                </a:schemeClr>
+              </a:solidFill>
+              <a:latin typeface="Consolas" pitchFamily="49" charset="0"/>
+            </a:endParaRPr>
+          </a:p>
+          <a:p>
+            <a:pPr>
+              <a:buFont typeface="Arial" pitchFamily="34" charset="0"/>
+              <a:buChar char="•"/>
+            </a:pPr>
+            <a:r>
+              <a:rPr lang="en-US" sz="800" i="1" smtClean="0">
+                <a:solidFill>
+                  <a:schemeClr val="accent6">
+                    <a:lumMod val="50000"/>
+                  </a:schemeClr>
+                </a:solidFill>
+                <a:latin typeface="Consolas" pitchFamily="49" charset="0"/>
+              </a:rPr>
+              <a:t> purpose of tags is to categorize characteristics that                           can cross table categories, for example:</a:t>
+            </a:r>
+          </a:p>
+          <a:p>
+            <a:r>
+              <a:rPr lang="en-US" sz="800" i="1" smtClean="0">
+                <a:solidFill>
+                  <a:schemeClr val="accent6">
+                    <a:lumMod val="50000"/>
+                  </a:schemeClr>
+                </a:solidFill>
+                <a:latin typeface="Consolas" pitchFamily="49" charset="0"/>
+              </a:rPr>
+              <a:t>“required | cheap | vigorous | local”</a:t>
+            </a:r>
+            <a:endParaRPr lang="en-US" sz="800" i="1">
+              <a:solidFill>
+                <a:schemeClr val="accent6">
+                  <a:lumMod val="50000"/>
+                </a:schemeClr>
+              </a:solidFill>
+              <a:latin typeface="Consolas" pitchFamily="49" charset="0"/>
+            </a:endParaRPr>
           </a:p>
         </p:txBody>
       </p:sp>

</xml_diff>

<commit_message>
Add password column to users table
</commit_message>
<xml_diff>
--- a/db/schema.pptx
+++ b/db/schema.pptx
@@ -3037,7 +3037,7 @@
       </p:grpSpPr>
       <p:pic>
         <p:nvPicPr>
-          <p:cNvPr id="1036" name="Picture 12"/>
+          <p:cNvPr id="1038" name="Picture 14"/>
           <p:cNvPicPr>
             <a:picLocks noChangeAspect="1" noChangeArrowheads="1"/>
           </p:cNvPicPr>
@@ -3052,8 +3052,8 @@
         </p:blipFill>
         <p:spPr bwMode="auto">
           <a:xfrm>
-            <a:off x="0" y="0"/>
-            <a:ext cx="9144000" cy="5840146"/>
+            <a:off x="0" y="1"/>
+            <a:ext cx="9144000" cy="5810596"/>
           </a:xfrm>
           <a:prstGeom prst="rect">
             <a:avLst/>
@@ -3439,8 +3439,8 @@
         </p:nvCxnSpPr>
         <p:spPr>
           <a:xfrm rot="16200000" flipH="1">
-            <a:off x="6743700" y="4686300"/>
-            <a:ext cx="1066800" cy="381000"/>
+            <a:off x="6705600" y="4648200"/>
+            <a:ext cx="1143000" cy="381000"/>
           </a:xfrm>
           <a:prstGeom prst="straightConnector1">
             <a:avLst/>
@@ -3615,8 +3615,8 @@
         </p:nvCxnSpPr>
         <p:spPr>
           <a:xfrm rot="5400000" flipH="1" flipV="1">
-            <a:off x="7620000" y="533400"/>
-            <a:ext cx="838200" cy="381000"/>
+            <a:off x="7505700" y="647700"/>
+            <a:ext cx="1066800" cy="381000"/>
           </a:xfrm>
           <a:prstGeom prst="straightConnector1">
             <a:avLst/>

</xml_diff>

<commit_message>
Final schema design (hopefully)
- Here is what Amad and I came up with after many hours on Wednesday
night discussing the limitations imposed by Sequelize and how they
helped us clarify the tables and table relationships needed.
</commit_message>
<xml_diff>
--- a/db/schema.pptx
+++ b/db/schema.pptx
@@ -3037,7 +3037,7 @@
       </p:grpSpPr>
       <p:pic>
         <p:nvPicPr>
-          <p:cNvPr id="1041" name="Picture 17"/>
+          <p:cNvPr id="1044" name="Picture 20"/>
           <p:cNvPicPr>
             <a:picLocks noChangeAspect="1" noChangeArrowheads="1"/>
           </p:cNvPicPr>
@@ -3052,8 +3052,8 @@
         </p:blipFill>
         <p:spPr bwMode="auto">
           <a:xfrm>
-            <a:off x="0" y="1126182"/>
-            <a:ext cx="9144000" cy="3826818"/>
+            <a:off x="0" y="1043439"/>
+            <a:ext cx="9144000" cy="4138161"/>
           </a:xfrm>
           <a:prstGeom prst="rect">
             <a:avLst/>
@@ -3076,7 +3076,7 @@
         </p:nvSpPr>
         <p:spPr>
           <a:xfrm>
-            <a:off x="2286000" y="3406914"/>
+            <a:off x="2362200" y="358914"/>
             <a:ext cx="1306768" cy="707886"/>
           </a:xfrm>
           <a:prstGeom prst="rect">
@@ -3094,7 +3094,7 @@
               <a:rPr lang="en-US" sz="800" b="1" smtClean="0">
                 <a:latin typeface="Consolas" pitchFamily="49" charset="0"/>
               </a:rPr>
-              <a:t>users invite_status:</a:t>
+              <a:t>trips invite_status:</a:t>
             </a:r>
           </a:p>
           <a:p>
@@ -3153,15 +3153,13 @@
       <p:cxnSp>
         <p:nvCxnSpPr>
           <p:cNvPr id="16" name="Straight Arrow Connector 15"/>
-          <p:cNvCxnSpPr>
-            <a:endCxn id="15" idx="0"/>
-          </p:cNvCxnSpPr>
+          <p:cNvCxnSpPr/>
           <p:nvPr/>
         </p:nvCxnSpPr>
         <p:spPr>
-          <a:xfrm rot="10800000" flipV="1">
-            <a:off x="2939384" y="2743200"/>
-            <a:ext cx="1023016" cy="663714"/>
+          <a:xfrm rot="16200000" flipV="1">
+            <a:off x="2705100" y="1866900"/>
+            <a:ext cx="1524000" cy="76200"/>
           </a:xfrm>
           <a:prstGeom prst="straightConnector1">
             <a:avLst/>
@@ -3193,7 +3191,7 @@
         </p:nvSpPr>
         <p:spPr>
           <a:xfrm>
-            <a:off x="445832" y="4800600"/>
+            <a:off x="304800" y="5071646"/>
             <a:ext cx="1306768" cy="338554"/>
           </a:xfrm>
           <a:prstGeom prst="rect">
@@ -3235,7 +3233,7 @@
         </p:nvCxnSpPr>
         <p:spPr>
           <a:xfrm rot="5400000">
-            <a:off x="799306" y="4533900"/>
+            <a:off x="799306" y="4761706"/>
             <a:ext cx="534194" cy="794"/>
           </a:xfrm>
           <a:prstGeom prst="straightConnector1">
@@ -3268,7 +3266,7 @@
         </p:nvSpPr>
         <p:spPr>
           <a:xfrm>
-            <a:off x="7467600" y="3429000"/>
+            <a:off x="7496422" y="3541693"/>
             <a:ext cx="1418978" cy="954107"/>
           </a:xfrm>
           <a:prstGeom prst="rect">
@@ -3286,7 +3284,7 @@
               <a:rPr lang="en-US" sz="800" b="1" smtClean="0">
                 <a:latin typeface="Consolas" pitchFamily="49" charset="0"/>
               </a:rPr>
-              <a:t>stuff borrow_slot: </a:t>
+              <a:t>borrow borrow_slot: </a:t>
             </a:r>
           </a:p>
           <a:p>
@@ -3438,9 +3436,9 @@
           <p:nvPr/>
         </p:nvCxnSpPr>
         <p:spPr>
-          <a:xfrm rot="16200000" flipH="1">
+          <a:xfrm rot="5400000">
             <a:off x="8191500" y="2933700"/>
-            <a:ext cx="914400" cy="76200"/>
+            <a:ext cx="990600" cy="1588"/>
           </a:xfrm>
           <a:prstGeom prst="straightConnector1">
             <a:avLst/>
@@ -3472,8 +3470,8 @@
         </p:nvSpPr>
         <p:spPr>
           <a:xfrm>
-            <a:off x="5759737" y="3429000"/>
-            <a:ext cx="1250663" cy="707886"/>
+            <a:off x="5943600" y="3512403"/>
+            <a:ext cx="1475084" cy="830997"/>
           </a:xfrm>
           <a:prstGeom prst="rect">
             <a:avLst/>
@@ -3490,7 +3488,15 @@
               <a:rPr lang="en-US" sz="800" b="1" smtClean="0">
                 <a:latin typeface="Consolas" pitchFamily="49" charset="0"/>
               </a:rPr>
-              <a:t>stuff share_status:</a:t>
+              <a:t>borrow share_status and</a:t>
+            </a:r>
+          </a:p>
+          <a:p>
+            <a:r>
+              <a:rPr lang="en-US" sz="800" b="1" smtClean="0">
+                <a:latin typeface="Consolas" pitchFamily="49" charset="0"/>
+              </a:rPr>
+              <a:t>required_users status:</a:t>
             </a:r>
           </a:p>
           <a:p>
@@ -3502,7 +3508,7 @@
               <a:rPr lang="en-US" sz="800" smtClean="0">
                 <a:latin typeface="Consolas" pitchFamily="49" charset="0"/>
               </a:rPr>
-              <a:t> have it</a:t>
+              <a:t> own</a:t>
             </a:r>
           </a:p>
           <a:p>
@@ -3520,7 +3526,7 @@
               <a:rPr lang="en-US" sz="800" smtClean="0">
                 <a:latin typeface="Consolas" pitchFamily="49" charset="0"/>
               </a:rPr>
-              <a:t>will buy it</a:t>
+              <a:t>buy</a:t>
             </a:r>
           </a:p>
           <a:p>
@@ -3532,7 +3538,7 @@
               <a:rPr lang="en-US" sz="800" smtClean="0">
                 <a:latin typeface="Consolas" pitchFamily="49" charset="0"/>
               </a:rPr>
-              <a:t>request to borrow</a:t>
+              <a:t> borrow</a:t>
             </a:r>
           </a:p>
           <a:p>
@@ -3544,7 +3550,7 @@
               <a:rPr lang="en-US" sz="800" smtClean="0">
                 <a:latin typeface="Consolas" pitchFamily="49" charset="0"/>
               </a:rPr>
-              <a:t>request fulfilled</a:t>
+              <a:t> borrowed</a:t>
             </a:r>
             <a:endParaRPr lang="en-US" sz="800">
               <a:latin typeface="Consolas" pitchFamily="49" charset="0"/>
@@ -3560,7 +3566,7 @@
         </p:nvSpPr>
         <p:spPr>
           <a:xfrm>
-            <a:off x="4267200" y="452735"/>
+            <a:off x="4532177" y="304800"/>
             <a:ext cx="801823" cy="461665"/>
           </a:xfrm>
           <a:prstGeom prst="rect">
@@ -3648,8 +3654,8 @@
         </p:nvCxnSpPr>
         <p:spPr>
           <a:xfrm rot="5400000">
-            <a:off x="6781800" y="2743200"/>
-            <a:ext cx="685800" cy="685800"/>
+            <a:off x="6934200" y="2667000"/>
+            <a:ext cx="838200" cy="685800"/>
           </a:xfrm>
           <a:prstGeom prst="straightConnector1">
             <a:avLst/>
@@ -3681,7 +3687,7 @@
         </p:nvSpPr>
         <p:spPr>
           <a:xfrm>
-            <a:off x="3048000" y="5029200"/>
+            <a:off x="3048000" y="5921514"/>
             <a:ext cx="3429000" cy="707886"/>
           </a:xfrm>
           <a:prstGeom prst="rect">
@@ -3830,7 +3836,7 @@
         </p:nvSpPr>
         <p:spPr>
           <a:xfrm>
-            <a:off x="5791200" y="1676400"/>
+            <a:off x="6112283" y="1676400"/>
             <a:ext cx="745717" cy="215444"/>
           </a:xfrm>
           <a:prstGeom prst="rect">
@@ -3866,6 +3872,225 @@
           </a:p>
         </p:txBody>
       </p:sp>
+      <p:sp>
+        <p:nvSpPr>
+          <p:cNvPr id="128" name="TextBox 127"/>
+          <p:cNvSpPr txBox="1"/>
+          <p:nvPr/>
+        </p:nvSpPr>
+        <p:spPr>
+          <a:xfrm>
+            <a:off x="4267200" y="3365956"/>
+            <a:ext cx="745717" cy="215444"/>
+          </a:xfrm>
+          <a:prstGeom prst="rect">
+            <a:avLst/>
+          </a:prstGeom>
+          <a:noFill/>
+        </p:spPr>
+        <p:txBody>
+          <a:bodyPr wrap="none" rtlCol="0">
+            <a:spAutoFit/>
+          </a:bodyPr>
+          <a:lstStyle/>
+          <a:p>
+            <a:r>
+              <a:rPr lang="en-US" sz="800" i="1" smtClean="0">
+                <a:solidFill>
+                  <a:schemeClr val="accent6">
+                    <a:lumMod val="50000"/>
+                  </a:schemeClr>
+                </a:solidFill>
+                <a:latin typeface="Consolas" pitchFamily="49" charset="0"/>
+              </a:rPr>
+              <a:t>join table</a:t>
+            </a:r>
+            <a:endParaRPr lang="en-US" sz="800" i="1">
+              <a:solidFill>
+                <a:schemeClr val="accent6">
+                  <a:lumMod val="50000"/>
+                </a:schemeClr>
+              </a:solidFill>
+              <a:latin typeface="Consolas" pitchFamily="49" charset="0"/>
+            </a:endParaRPr>
+          </a:p>
+        </p:txBody>
+      </p:sp>
+      <p:sp>
+        <p:nvSpPr>
+          <p:cNvPr id="131" name="TextBox 130"/>
+          <p:cNvSpPr txBox="1"/>
+          <p:nvPr/>
+        </p:nvSpPr>
+        <p:spPr>
+          <a:xfrm>
+            <a:off x="2427032" y="5181600"/>
+            <a:ext cx="2148345" cy="584775"/>
+          </a:xfrm>
+          <a:prstGeom prst="rect">
+            <a:avLst/>
+          </a:prstGeom>
+          <a:noFill/>
+        </p:spPr>
+        <p:txBody>
+          <a:bodyPr wrap="none" rtlCol="0">
+            <a:spAutoFit/>
+          </a:bodyPr>
+          <a:lstStyle/>
+          <a:p>
+            <a:r>
+              <a:rPr lang="en-US" sz="800" b="1" smtClean="0">
+                <a:solidFill>
+                  <a:schemeClr val="accent5">
+                    <a:lumMod val="75000"/>
+                  </a:schemeClr>
+                </a:solidFill>
+                <a:latin typeface="Consolas" pitchFamily="49" charset="0"/>
+              </a:rPr>
+              <a:t>“required” table</a:t>
+            </a:r>
+          </a:p>
+          <a:p>
+            <a:r>
+              <a:rPr lang="en-US" sz="800" smtClean="0">
+                <a:solidFill>
+                  <a:schemeClr val="accent5">
+                    <a:lumMod val="75000"/>
+                  </a:schemeClr>
+                </a:solidFill>
+                <a:latin typeface="Consolas" pitchFamily="49" charset="0"/>
+              </a:rPr>
+              <a:t>this table contains required or</a:t>
+            </a:r>
+          </a:p>
+          <a:p>
+            <a:r>
+              <a:rPr lang="en-US" sz="800" smtClean="0">
+                <a:solidFill>
+                  <a:schemeClr val="accent5">
+                    <a:lumMod val="75000"/>
+                  </a:schemeClr>
+                </a:solidFill>
+                <a:latin typeface="Consolas" pitchFamily="49" charset="0"/>
+              </a:rPr>
+              <a:t>recommended trip items first set by</a:t>
+            </a:r>
+          </a:p>
+          <a:p>
+            <a:r>
+              <a:rPr lang="en-US" sz="800" smtClean="0">
+                <a:solidFill>
+                  <a:schemeClr val="accent5">
+                    <a:lumMod val="75000"/>
+                  </a:schemeClr>
+                </a:solidFill>
+                <a:latin typeface="Consolas" pitchFamily="49" charset="0"/>
+              </a:rPr>
+              <a:t>the organizer.</a:t>
+            </a:r>
+            <a:endParaRPr lang="en-US" sz="800">
+              <a:solidFill>
+                <a:schemeClr val="accent5">
+                  <a:lumMod val="75000"/>
+                </a:schemeClr>
+              </a:solidFill>
+              <a:latin typeface="Consolas" pitchFamily="49" charset="0"/>
+            </a:endParaRPr>
+          </a:p>
+        </p:txBody>
+      </p:sp>
+      <p:sp>
+        <p:nvSpPr>
+          <p:cNvPr id="132" name="TextBox 131"/>
+          <p:cNvSpPr txBox="1"/>
+          <p:nvPr/>
+        </p:nvSpPr>
+        <p:spPr>
+          <a:xfrm>
+            <a:off x="7543800" y="4579203"/>
+            <a:ext cx="1538745" cy="830997"/>
+          </a:xfrm>
+          <a:prstGeom prst="rect">
+            <a:avLst/>
+          </a:prstGeom>
+          <a:noFill/>
+        </p:spPr>
+        <p:txBody>
+          <a:bodyPr wrap="square" rtlCol="0">
+            <a:spAutoFit/>
+          </a:bodyPr>
+          <a:lstStyle/>
+          <a:p>
+            <a:r>
+              <a:rPr lang="en-US" sz="800" b="1" smtClean="0">
+                <a:solidFill>
+                  <a:schemeClr val="accent5">
+                    <a:lumMod val="75000"/>
+                  </a:schemeClr>
+                </a:solidFill>
+                <a:latin typeface="Consolas" pitchFamily="49" charset="0"/>
+              </a:rPr>
+              <a:t>“borrow” table</a:t>
+            </a:r>
+          </a:p>
+          <a:p>
+            <a:r>
+              <a:rPr lang="en-US" sz="800" smtClean="0">
+                <a:solidFill>
+                  <a:schemeClr val="accent5">
+                    <a:lumMod val="75000"/>
+                  </a:schemeClr>
+                </a:solidFill>
+                <a:latin typeface="Consolas" pitchFamily="49" charset="0"/>
+              </a:rPr>
+              <a:t>this table contains trip equipment, clothes, or food items that are owned by users or can be loaned and borrowed.</a:t>
+            </a:r>
+            <a:endParaRPr lang="en-US" sz="800">
+              <a:solidFill>
+                <a:schemeClr val="accent5">
+                  <a:lumMod val="75000"/>
+                </a:schemeClr>
+              </a:solidFill>
+              <a:latin typeface="Consolas" pitchFamily="49" charset="0"/>
+            </a:endParaRPr>
+          </a:p>
+        </p:txBody>
+      </p:sp>
+      <p:cxnSp>
+        <p:nvCxnSpPr>
+          <p:cNvPr id="133" name="Straight Arrow Connector 132"/>
+          <p:cNvCxnSpPr>
+            <a:endCxn id="71" idx="1"/>
+          </p:cNvCxnSpPr>
+          <p:nvPr/>
+        </p:nvCxnSpPr>
+        <p:spPr>
+          <a:xfrm rot="5400000" flipH="1" flipV="1">
+            <a:off x="5583451" y="3983251"/>
+            <a:ext cx="415498" cy="304800"/>
+          </a:xfrm>
+          <a:prstGeom prst="straightConnector1">
+            <a:avLst/>
+          </a:prstGeom>
+          <a:ln>
+            <a:tailEnd type="arrow"/>
+          </a:ln>
+        </p:spPr>
+        <p:style>
+          <a:lnRef idx="1">
+            <a:schemeClr val="accent1"/>
+          </a:lnRef>
+          <a:fillRef idx="0">
+            <a:schemeClr val="accent1"/>
+          </a:fillRef>
+          <a:effectRef idx="0">
+            <a:schemeClr val="accent1"/>
+          </a:effectRef>
+          <a:fontRef idx="minor">
+            <a:schemeClr val="tx1"/>
+          </a:fontRef>
+        </p:style>
+      </p:cxnSp>
     </p:spTree>
   </p:cSld>
   <p:clrMapOvr>

</xml_diff>

<commit_message>
Add quantity to required table, status codes
- status codes for required table and borrow table should be separate.
</commit_message>
<xml_diff>
--- a/db/schema.pptx
+++ b/db/schema.pptx
@@ -288,7 +288,8 @@
           <a:p>
             <a:fld id="{C02655D8-6B40-4A9B-AF24-72F88B877958}" type="datetimeFigureOut">
               <a:rPr lang="en-US" smtClean="0"/>
-              <a:t>10/26/2016</a:t>
+              <a:pPr/>
+              <a:t>10/27/2016</a:t>
             </a:fld>
             <a:endParaRPr lang="en-US"/>
           </a:p>
@@ -330,6 +331,7 @@
           <a:p>
             <a:fld id="{05B83E4C-7A2C-49CC-88E9-369D9442867E}" type="slidenum">
               <a:rPr lang="en-US" smtClean="0"/>
+              <a:pPr/>
               <a:t>‹#›</a:t>
             </a:fld>
             <a:endParaRPr lang="en-US"/>
@@ -453,7 +455,8 @@
           <a:p>
             <a:fld id="{C02655D8-6B40-4A9B-AF24-72F88B877958}" type="datetimeFigureOut">
               <a:rPr lang="en-US" smtClean="0"/>
-              <a:t>10/26/2016</a:t>
+              <a:pPr/>
+              <a:t>10/27/2016</a:t>
             </a:fld>
             <a:endParaRPr lang="en-US"/>
           </a:p>
@@ -495,6 +498,7 @@
           <a:p>
             <a:fld id="{05B83E4C-7A2C-49CC-88E9-369D9442867E}" type="slidenum">
               <a:rPr lang="en-US" smtClean="0"/>
+              <a:pPr/>
               <a:t>‹#›</a:t>
             </a:fld>
             <a:endParaRPr lang="en-US"/>
@@ -628,7 +632,8 @@
           <a:p>
             <a:fld id="{C02655D8-6B40-4A9B-AF24-72F88B877958}" type="datetimeFigureOut">
               <a:rPr lang="en-US" smtClean="0"/>
-              <a:t>10/26/2016</a:t>
+              <a:pPr/>
+              <a:t>10/27/2016</a:t>
             </a:fld>
             <a:endParaRPr lang="en-US"/>
           </a:p>
@@ -670,6 +675,7 @@
           <a:p>
             <a:fld id="{05B83E4C-7A2C-49CC-88E9-369D9442867E}" type="slidenum">
               <a:rPr lang="en-US" smtClean="0"/>
+              <a:pPr/>
               <a:t>‹#›</a:t>
             </a:fld>
             <a:endParaRPr lang="en-US"/>
@@ -793,7 +799,8 @@
           <a:p>
             <a:fld id="{C02655D8-6B40-4A9B-AF24-72F88B877958}" type="datetimeFigureOut">
               <a:rPr lang="en-US" smtClean="0"/>
-              <a:t>10/26/2016</a:t>
+              <a:pPr/>
+              <a:t>10/27/2016</a:t>
             </a:fld>
             <a:endParaRPr lang="en-US"/>
           </a:p>
@@ -835,6 +842,7 @@
           <a:p>
             <a:fld id="{05B83E4C-7A2C-49CC-88E9-369D9442867E}" type="slidenum">
               <a:rPr lang="en-US" smtClean="0"/>
+              <a:pPr/>
               <a:t>‹#›</a:t>
             </a:fld>
             <a:endParaRPr lang="en-US"/>
@@ -1034,7 +1042,8 @@
           <a:p>
             <a:fld id="{C02655D8-6B40-4A9B-AF24-72F88B877958}" type="datetimeFigureOut">
               <a:rPr lang="en-US" smtClean="0"/>
-              <a:t>10/26/2016</a:t>
+              <a:pPr/>
+              <a:t>10/27/2016</a:t>
             </a:fld>
             <a:endParaRPr lang="en-US"/>
           </a:p>
@@ -1076,6 +1085,7 @@
           <a:p>
             <a:fld id="{05B83E4C-7A2C-49CC-88E9-369D9442867E}" type="slidenum">
               <a:rPr lang="en-US" smtClean="0"/>
+              <a:pPr/>
               <a:t>‹#›</a:t>
             </a:fld>
             <a:endParaRPr lang="en-US"/>
@@ -1317,7 +1327,8 @@
           <a:p>
             <a:fld id="{C02655D8-6B40-4A9B-AF24-72F88B877958}" type="datetimeFigureOut">
               <a:rPr lang="en-US" smtClean="0"/>
-              <a:t>10/26/2016</a:t>
+              <a:pPr/>
+              <a:t>10/27/2016</a:t>
             </a:fld>
             <a:endParaRPr lang="en-US"/>
           </a:p>
@@ -1359,6 +1370,7 @@
           <a:p>
             <a:fld id="{05B83E4C-7A2C-49CC-88E9-369D9442867E}" type="slidenum">
               <a:rPr lang="en-US" smtClean="0"/>
+              <a:pPr/>
               <a:t>‹#›</a:t>
             </a:fld>
             <a:endParaRPr lang="en-US"/>
@@ -1734,7 +1746,8 @@
           <a:p>
             <a:fld id="{C02655D8-6B40-4A9B-AF24-72F88B877958}" type="datetimeFigureOut">
               <a:rPr lang="en-US" smtClean="0"/>
-              <a:t>10/26/2016</a:t>
+              <a:pPr/>
+              <a:t>10/27/2016</a:t>
             </a:fld>
             <a:endParaRPr lang="en-US"/>
           </a:p>
@@ -1776,6 +1789,7 @@
           <a:p>
             <a:fld id="{05B83E4C-7A2C-49CC-88E9-369D9442867E}" type="slidenum">
               <a:rPr lang="en-US" smtClean="0"/>
+              <a:pPr/>
               <a:t>‹#›</a:t>
             </a:fld>
             <a:endParaRPr lang="en-US"/>
@@ -1847,7 +1861,8 @@
           <a:p>
             <a:fld id="{C02655D8-6B40-4A9B-AF24-72F88B877958}" type="datetimeFigureOut">
               <a:rPr lang="en-US" smtClean="0"/>
-              <a:t>10/26/2016</a:t>
+              <a:pPr/>
+              <a:t>10/27/2016</a:t>
             </a:fld>
             <a:endParaRPr lang="en-US"/>
           </a:p>
@@ -1889,6 +1904,7 @@
           <a:p>
             <a:fld id="{05B83E4C-7A2C-49CC-88E9-369D9442867E}" type="slidenum">
               <a:rPr lang="en-US" smtClean="0"/>
+              <a:pPr/>
               <a:t>‹#›</a:t>
             </a:fld>
             <a:endParaRPr lang="en-US"/>
@@ -1937,7 +1953,8 @@
           <a:p>
             <a:fld id="{C02655D8-6B40-4A9B-AF24-72F88B877958}" type="datetimeFigureOut">
               <a:rPr lang="en-US" smtClean="0"/>
-              <a:t>10/26/2016</a:t>
+              <a:pPr/>
+              <a:t>10/27/2016</a:t>
             </a:fld>
             <a:endParaRPr lang="en-US"/>
           </a:p>
@@ -1979,6 +1996,7 @@
           <a:p>
             <a:fld id="{05B83E4C-7A2C-49CC-88E9-369D9442867E}" type="slidenum">
               <a:rPr lang="en-US" smtClean="0"/>
+              <a:pPr/>
               <a:t>‹#›</a:t>
             </a:fld>
             <a:endParaRPr lang="en-US"/>
@@ -2209,7 +2227,8 @@
           <a:p>
             <a:fld id="{C02655D8-6B40-4A9B-AF24-72F88B877958}" type="datetimeFigureOut">
               <a:rPr lang="en-US" smtClean="0"/>
-              <a:t>10/26/2016</a:t>
+              <a:pPr/>
+              <a:t>10/27/2016</a:t>
             </a:fld>
             <a:endParaRPr lang="en-US"/>
           </a:p>
@@ -2251,6 +2270,7 @@
           <a:p>
             <a:fld id="{05B83E4C-7A2C-49CC-88E9-369D9442867E}" type="slidenum">
               <a:rPr lang="en-US" smtClean="0"/>
+              <a:pPr/>
               <a:t>‹#›</a:t>
             </a:fld>
             <a:endParaRPr lang="en-US"/>
@@ -2457,7 +2477,8 @@
           <a:p>
             <a:fld id="{C02655D8-6B40-4A9B-AF24-72F88B877958}" type="datetimeFigureOut">
               <a:rPr lang="en-US" smtClean="0"/>
-              <a:t>10/26/2016</a:t>
+              <a:pPr/>
+              <a:t>10/27/2016</a:t>
             </a:fld>
             <a:endParaRPr lang="en-US"/>
           </a:p>
@@ -2499,6 +2520,7 @@
           <a:p>
             <a:fld id="{05B83E4C-7A2C-49CC-88E9-369D9442867E}" type="slidenum">
               <a:rPr lang="en-US" smtClean="0"/>
+              <a:pPr/>
               <a:t>‹#›</a:t>
             </a:fld>
             <a:endParaRPr lang="en-US"/>
@@ -2665,7 +2687,8 @@
           <a:p>
             <a:fld id="{C02655D8-6B40-4A9B-AF24-72F88B877958}" type="datetimeFigureOut">
               <a:rPr lang="en-US" smtClean="0"/>
-              <a:t>10/26/2016</a:t>
+              <a:pPr/>
+              <a:t>10/27/2016</a:t>
             </a:fld>
             <a:endParaRPr lang="en-US"/>
           </a:p>
@@ -2743,6 +2766,7 @@
           <a:p>
             <a:fld id="{05B83E4C-7A2C-49CC-88E9-369D9442867E}" type="slidenum">
               <a:rPr lang="en-US" smtClean="0"/>
+              <a:pPr/>
               <a:t>‹#›</a:t>
             </a:fld>
             <a:endParaRPr lang="en-US"/>
@@ -3037,7 +3061,7 @@
       </p:grpSpPr>
       <p:pic>
         <p:nvPicPr>
-          <p:cNvPr id="1044" name="Picture 20"/>
+          <p:cNvPr id="1026" name="Picture 2"/>
           <p:cNvPicPr>
             <a:picLocks noChangeAspect="1" noChangeArrowheads="1"/>
           </p:cNvPicPr>
@@ -3052,8 +3076,8 @@
         </p:blipFill>
         <p:spPr bwMode="auto">
           <a:xfrm>
-            <a:off x="0" y="1043439"/>
-            <a:ext cx="9144000" cy="4138161"/>
+            <a:off x="0" y="994768"/>
+            <a:ext cx="9144000" cy="4567832"/>
           </a:xfrm>
           <a:prstGeom prst="rect">
             <a:avLst/>
@@ -3470,8 +3494,8 @@
         </p:nvSpPr>
         <p:spPr>
           <a:xfrm>
-            <a:off x="5943600" y="3512403"/>
-            <a:ext cx="1475084" cy="830997"/>
+            <a:off x="4876800" y="4648200"/>
+            <a:ext cx="1475084" cy="707886"/>
           </a:xfrm>
           <a:prstGeom prst="rect">
             <a:avLst/>
@@ -3488,15 +3512,13 @@
               <a:rPr lang="en-US" sz="800" b="1" smtClean="0">
                 <a:latin typeface="Consolas" pitchFamily="49" charset="0"/>
               </a:rPr>
-              <a:t>borrow share_status and</a:t>
-            </a:r>
-          </a:p>
-          <a:p>
+              <a:t>required_users </a:t>
+            </a:r>
             <a:r>
               <a:rPr lang="en-US" sz="800" b="1" smtClean="0">
                 <a:latin typeface="Consolas" pitchFamily="49" charset="0"/>
               </a:rPr>
-              <a:t>required_users status:</a:t>
+              <a:t>status:</a:t>
             </a:r>
           </a:p>
           <a:p>
@@ -3508,8 +3530,17 @@
               <a:rPr lang="en-US" sz="800" smtClean="0">
                 <a:latin typeface="Consolas" pitchFamily="49" charset="0"/>
               </a:rPr>
-              <a:t> own</a:t>
-            </a:r>
+              <a:t> </a:t>
+            </a:r>
+            <a:r>
+              <a:rPr lang="en-US" sz="800" smtClean="0">
+                <a:latin typeface="Consolas" pitchFamily="49" charset="0"/>
+              </a:rPr>
+              <a:t>i own it</a:t>
+            </a:r>
+            <a:endParaRPr lang="en-US" sz="800" smtClean="0">
+              <a:latin typeface="Consolas" pitchFamily="49" charset="0"/>
+            </a:endParaRPr>
           </a:p>
           <a:p>
             <a:pPr>
@@ -3526,8 +3557,11 @@
               <a:rPr lang="en-US" sz="800" smtClean="0">
                 <a:latin typeface="Consolas" pitchFamily="49" charset="0"/>
               </a:rPr>
-              <a:t>buy</a:t>
-            </a:r>
+              <a:t>i will buy it</a:t>
+            </a:r>
+            <a:endParaRPr lang="en-US" sz="800" smtClean="0">
+              <a:latin typeface="Consolas" pitchFamily="49" charset="0"/>
+            </a:endParaRPr>
           </a:p>
           <a:p>
             <a:pPr>
@@ -3538,8 +3572,17 @@
               <a:rPr lang="en-US" sz="800" smtClean="0">
                 <a:latin typeface="Consolas" pitchFamily="49" charset="0"/>
               </a:rPr>
-              <a:t> borrow</a:t>
-            </a:r>
+              <a:t> </a:t>
+            </a:r>
+            <a:r>
+              <a:rPr lang="en-US" sz="800" smtClean="0">
+                <a:latin typeface="Consolas" pitchFamily="49" charset="0"/>
+              </a:rPr>
+              <a:t>i need to borrow</a:t>
+            </a:r>
+            <a:endParaRPr lang="en-US" sz="800" smtClean="0">
+              <a:latin typeface="Consolas" pitchFamily="49" charset="0"/>
+            </a:endParaRPr>
           </a:p>
           <a:p>
             <a:pPr>
@@ -3550,7 +3593,13 @@
               <a:rPr lang="en-US" sz="800" smtClean="0">
                 <a:latin typeface="Consolas" pitchFamily="49" charset="0"/>
               </a:rPr>
-              <a:t> borrowed</a:t>
+              <a:t> </a:t>
+            </a:r>
+            <a:r>
+              <a:rPr lang="en-US" sz="800" smtClean="0">
+                <a:latin typeface="Consolas" pitchFamily="49" charset="0"/>
+              </a:rPr>
+              <a:t>being borrowed</a:t>
             </a:r>
             <a:endParaRPr lang="en-US" sz="800">
               <a:latin typeface="Consolas" pitchFamily="49" charset="0"/>
@@ -3654,8 +3703,8 @@
         </p:nvCxnSpPr>
         <p:spPr>
           <a:xfrm rot="5400000">
-            <a:off x="6934200" y="2667000"/>
-            <a:ext cx="838200" cy="685800"/>
+            <a:off x="6934200" y="2590800"/>
+            <a:ext cx="762000" cy="762000"/>
           </a:xfrm>
           <a:prstGeom prst="straightConnector1">
             <a:avLst/>
@@ -3836,7 +3885,7 @@
         </p:nvSpPr>
         <p:spPr>
           <a:xfrm>
-            <a:off x="6112283" y="1676400"/>
+            <a:off x="6112283" y="1689556"/>
             <a:ext cx="745717" cy="215444"/>
           </a:xfrm>
           <a:prstGeom prst="rect">
@@ -3880,7 +3929,7 @@
         </p:nvSpPr>
         <p:spPr>
           <a:xfrm>
-            <a:off x="4267200" y="3365956"/>
+            <a:off x="4267200" y="3352800"/>
             <a:ext cx="745717" cy="215444"/>
           </a:xfrm>
           <a:prstGeom prst="rect">
@@ -3924,7 +3973,7 @@
         </p:nvSpPr>
         <p:spPr>
           <a:xfrm>
-            <a:off x="2427032" y="5181600"/>
+            <a:off x="2427032" y="5282625"/>
             <a:ext cx="2148345" cy="584775"/>
           </a:xfrm>
           <a:prstGeom prst="rect">
@@ -4059,15 +4108,13 @@
       <p:cxnSp>
         <p:nvCxnSpPr>
           <p:cNvPr id="133" name="Straight Arrow Connector 132"/>
-          <p:cNvCxnSpPr>
-            <a:endCxn id="71" idx="1"/>
-          </p:cNvCxnSpPr>
+          <p:cNvCxnSpPr/>
           <p:nvPr/>
         </p:nvCxnSpPr>
         <p:spPr>
-          <a:xfrm rot="5400000" flipH="1" flipV="1">
-            <a:off x="5583451" y="3983251"/>
-            <a:ext cx="415498" cy="304800"/>
+          <a:xfrm>
+            <a:off x="4495801" y="4419599"/>
+            <a:ext cx="381001" cy="304803"/>
           </a:xfrm>
           <a:prstGeom prst="straightConnector1">
             <a:avLst/>
@@ -4091,6 +4138,79 @@
           </a:fontRef>
         </p:style>
       </p:cxnSp>
+      <p:sp>
+        <p:nvSpPr>
+          <p:cNvPr id="26" name="TextBox 25"/>
+          <p:cNvSpPr txBox="1"/>
+          <p:nvPr/>
+        </p:nvSpPr>
+        <p:spPr>
+          <a:xfrm>
+            <a:off x="5943600" y="3352800"/>
+            <a:ext cx="1306768" cy="461665"/>
+          </a:xfrm>
+          <a:prstGeom prst="rect">
+            <a:avLst/>
+          </a:prstGeom>
+          <a:noFill/>
+        </p:spPr>
+        <p:txBody>
+          <a:bodyPr wrap="none" rtlCol="0">
+            <a:spAutoFit/>
+          </a:bodyPr>
+          <a:lstStyle/>
+          <a:p>
+            <a:r>
+              <a:rPr lang="en-US" sz="800" b="1" smtClean="0">
+                <a:latin typeface="Consolas" pitchFamily="49" charset="0"/>
+              </a:rPr>
+              <a:t>borrow share_status</a:t>
+            </a:r>
+            <a:r>
+              <a:rPr lang="en-US" sz="800" b="1" smtClean="0">
+                <a:latin typeface="Consolas" pitchFamily="49" charset="0"/>
+              </a:rPr>
+              <a:t>:</a:t>
+            </a:r>
+          </a:p>
+          <a:p>
+            <a:pPr>
+              <a:buFontTx/>
+              <a:buChar char="-"/>
+            </a:pPr>
+            <a:r>
+              <a:rPr lang="en-US" sz="800" smtClean="0">
+                <a:latin typeface="Consolas" pitchFamily="49" charset="0"/>
+              </a:rPr>
+              <a:t> being borrowed</a:t>
+            </a:r>
+            <a:endParaRPr lang="en-US" sz="800" smtClean="0">
+              <a:latin typeface="Consolas" pitchFamily="49" charset="0"/>
+            </a:endParaRPr>
+          </a:p>
+          <a:p>
+            <a:pPr>
+              <a:buFontTx/>
+              <a:buChar char="-"/>
+            </a:pPr>
+            <a:r>
+              <a:rPr lang="en-US" sz="800" smtClean="0">
+                <a:latin typeface="Consolas" pitchFamily="49" charset="0"/>
+              </a:rPr>
+              <a:t> </a:t>
+            </a:r>
+            <a:r>
+              <a:rPr lang="en-US" sz="800" smtClean="0">
+                <a:latin typeface="Consolas" pitchFamily="49" charset="0"/>
+              </a:rPr>
+              <a:t>not being borrowed</a:t>
+            </a:r>
+            <a:endParaRPr lang="en-US" sz="800">
+              <a:latin typeface="Consolas" pitchFamily="49" charset="0"/>
+            </a:endParaRPr>
+          </a:p>
+        </p:txBody>
+      </p:sp>
     </p:spTree>
   </p:cSld>
   <p:clrMapOvr>

</xml_diff>

<commit_message>
Update schema to have simpler structure
- Removing references to the borrow table as we're trying to implement
a simpler feature set.
</commit_message>
<xml_diff>
--- a/db/schema.pptx
+++ b/db/schema.pptx
@@ -289,7 +289,7 @@
             <a:fld id="{C02655D8-6B40-4A9B-AF24-72F88B877958}" type="datetimeFigureOut">
               <a:rPr lang="en-US" smtClean="0"/>
               <a:pPr/>
-              <a:t>10/27/2016</a:t>
+              <a:t>10/29/2016</a:t>
             </a:fld>
             <a:endParaRPr lang="en-US"/>
           </a:p>
@@ -456,7 +456,7 @@
             <a:fld id="{C02655D8-6B40-4A9B-AF24-72F88B877958}" type="datetimeFigureOut">
               <a:rPr lang="en-US" smtClean="0"/>
               <a:pPr/>
-              <a:t>10/27/2016</a:t>
+              <a:t>10/29/2016</a:t>
             </a:fld>
             <a:endParaRPr lang="en-US"/>
           </a:p>
@@ -633,7 +633,7 @@
             <a:fld id="{C02655D8-6B40-4A9B-AF24-72F88B877958}" type="datetimeFigureOut">
               <a:rPr lang="en-US" smtClean="0"/>
               <a:pPr/>
-              <a:t>10/27/2016</a:t>
+              <a:t>10/29/2016</a:t>
             </a:fld>
             <a:endParaRPr lang="en-US"/>
           </a:p>
@@ -800,7 +800,7 @@
             <a:fld id="{C02655D8-6B40-4A9B-AF24-72F88B877958}" type="datetimeFigureOut">
               <a:rPr lang="en-US" smtClean="0"/>
               <a:pPr/>
-              <a:t>10/27/2016</a:t>
+              <a:t>10/29/2016</a:t>
             </a:fld>
             <a:endParaRPr lang="en-US"/>
           </a:p>
@@ -1043,7 +1043,7 @@
             <a:fld id="{C02655D8-6B40-4A9B-AF24-72F88B877958}" type="datetimeFigureOut">
               <a:rPr lang="en-US" smtClean="0"/>
               <a:pPr/>
-              <a:t>10/27/2016</a:t>
+              <a:t>10/29/2016</a:t>
             </a:fld>
             <a:endParaRPr lang="en-US"/>
           </a:p>
@@ -1328,7 +1328,7 @@
             <a:fld id="{C02655D8-6B40-4A9B-AF24-72F88B877958}" type="datetimeFigureOut">
               <a:rPr lang="en-US" smtClean="0"/>
               <a:pPr/>
-              <a:t>10/27/2016</a:t>
+              <a:t>10/29/2016</a:t>
             </a:fld>
             <a:endParaRPr lang="en-US"/>
           </a:p>
@@ -1747,7 +1747,7 @@
             <a:fld id="{C02655D8-6B40-4A9B-AF24-72F88B877958}" type="datetimeFigureOut">
               <a:rPr lang="en-US" smtClean="0"/>
               <a:pPr/>
-              <a:t>10/27/2016</a:t>
+              <a:t>10/29/2016</a:t>
             </a:fld>
             <a:endParaRPr lang="en-US"/>
           </a:p>
@@ -1862,7 +1862,7 @@
             <a:fld id="{C02655D8-6B40-4A9B-AF24-72F88B877958}" type="datetimeFigureOut">
               <a:rPr lang="en-US" smtClean="0"/>
               <a:pPr/>
-              <a:t>10/27/2016</a:t>
+              <a:t>10/29/2016</a:t>
             </a:fld>
             <a:endParaRPr lang="en-US"/>
           </a:p>
@@ -1954,7 +1954,7 @@
             <a:fld id="{C02655D8-6B40-4A9B-AF24-72F88B877958}" type="datetimeFigureOut">
               <a:rPr lang="en-US" smtClean="0"/>
               <a:pPr/>
-              <a:t>10/27/2016</a:t>
+              <a:t>10/29/2016</a:t>
             </a:fld>
             <a:endParaRPr lang="en-US"/>
           </a:p>
@@ -2228,7 +2228,7 @@
             <a:fld id="{C02655D8-6B40-4A9B-AF24-72F88B877958}" type="datetimeFigureOut">
               <a:rPr lang="en-US" smtClean="0"/>
               <a:pPr/>
-              <a:t>10/27/2016</a:t>
+              <a:t>10/29/2016</a:t>
             </a:fld>
             <a:endParaRPr lang="en-US"/>
           </a:p>
@@ -2478,7 +2478,7 @@
             <a:fld id="{C02655D8-6B40-4A9B-AF24-72F88B877958}" type="datetimeFigureOut">
               <a:rPr lang="en-US" smtClean="0"/>
               <a:pPr/>
-              <a:t>10/27/2016</a:t>
+              <a:t>10/29/2016</a:t>
             </a:fld>
             <a:endParaRPr lang="en-US"/>
           </a:p>
@@ -2688,7 +2688,7 @@
             <a:fld id="{C02655D8-6B40-4A9B-AF24-72F88B877958}" type="datetimeFigureOut">
               <a:rPr lang="en-US" smtClean="0"/>
               <a:pPr/>
-              <a:t>10/27/2016</a:t>
+              <a:t>10/29/2016</a:t>
             </a:fld>
             <a:endParaRPr lang="en-US"/>
           </a:p>
@@ -3061,7 +3061,7 @@
       </p:grpSpPr>
       <p:pic>
         <p:nvPicPr>
-          <p:cNvPr id="1026" name="Picture 2"/>
+          <p:cNvPr id="1027" name="Picture 3"/>
           <p:cNvPicPr>
             <a:picLocks noChangeAspect="1" noChangeArrowheads="1"/>
           </p:cNvPicPr>
@@ -3076,8 +3076,8 @@
         </p:blipFill>
         <p:spPr bwMode="auto">
           <a:xfrm>
-            <a:off x="0" y="994768"/>
-            <a:ext cx="9144000" cy="4567832"/>
+            <a:off x="0" y="914400"/>
+            <a:ext cx="9144000" cy="4581162"/>
           </a:xfrm>
           <a:prstGeom prst="rect">
             <a:avLst/>
@@ -3100,8 +3100,8 @@
         </p:nvSpPr>
         <p:spPr>
           <a:xfrm>
-            <a:off x="2362200" y="358914"/>
-            <a:ext cx="1306768" cy="707886"/>
+            <a:off x="1981200" y="4245114"/>
+            <a:ext cx="1643399" cy="707886"/>
           </a:xfrm>
           <a:prstGeom prst="rect">
             <a:avLst/>
@@ -3118,7 +3118,13 @@
               <a:rPr lang="en-US" sz="800" b="1" smtClean="0">
                 <a:latin typeface="Consolas" pitchFamily="49" charset="0"/>
               </a:rPr>
-              <a:t>trips invite_status:</a:t>
+              <a:t>trips_users </a:t>
+            </a:r>
+            <a:r>
+              <a:rPr lang="en-US" sz="800" b="1" smtClean="0">
+                <a:latin typeface="Consolas" pitchFamily="49" charset="0"/>
+              </a:rPr>
+              <a:t>invite_status:</a:t>
             </a:r>
           </a:p>
           <a:p>
@@ -3181,9 +3187,9 @@
           <p:nvPr/>
         </p:nvCxnSpPr>
         <p:spPr>
-          <a:xfrm rot="16200000" flipV="1">
-            <a:off x="2705100" y="1866900"/>
-            <a:ext cx="1524000" cy="76200"/>
+          <a:xfrm rot="5400000">
+            <a:off x="1828800" y="3352800"/>
+            <a:ext cx="1447800" cy="381000"/>
           </a:xfrm>
           <a:prstGeom prst="straightConnector1">
             <a:avLst/>
@@ -3215,7 +3221,7 @@
         </p:nvSpPr>
         <p:spPr>
           <a:xfrm>
-            <a:off x="304800" y="5071646"/>
+            <a:off x="304800" y="5300246"/>
             <a:ext cx="1306768" cy="338554"/>
           </a:xfrm>
           <a:prstGeom prst="rect">
@@ -3233,7 +3239,13 @@
               <a:rPr lang="en-US" sz="800" b="1" smtClean="0">
                 <a:latin typeface="Consolas" pitchFamily="49" charset="0"/>
               </a:rPr>
-              <a:t>tripterms category:</a:t>
+              <a:t>terms </a:t>
+            </a:r>
+            <a:r>
+              <a:rPr lang="en-US" sz="800" b="1" smtClean="0">
+                <a:latin typeface="Consolas" pitchFamily="49" charset="0"/>
+              </a:rPr>
+              <a:t>category:</a:t>
             </a:r>
           </a:p>
           <a:p>
@@ -3257,7 +3269,7 @@
         </p:nvCxnSpPr>
         <p:spPr>
           <a:xfrm rot="5400000">
-            <a:off x="799306" y="4761706"/>
+            <a:off x="342106" y="4990306"/>
             <a:ext cx="534194" cy="794"/>
           </a:xfrm>
           <a:prstGeom prst="straightConnector1">
@@ -3284,103 +3296,6 @@
       </p:cxnSp>
       <p:sp>
         <p:nvSpPr>
-          <p:cNvPr id="33" name="TextBox 32"/>
-          <p:cNvSpPr txBox="1"/>
-          <p:nvPr/>
-        </p:nvSpPr>
-        <p:spPr>
-          <a:xfrm>
-            <a:off x="7496422" y="3541693"/>
-            <a:ext cx="1418978" cy="954107"/>
-          </a:xfrm>
-          <a:prstGeom prst="rect">
-            <a:avLst/>
-          </a:prstGeom>
-          <a:noFill/>
-        </p:spPr>
-        <p:txBody>
-          <a:bodyPr wrap="none" rtlCol="0">
-            <a:spAutoFit/>
-          </a:bodyPr>
-          <a:lstStyle/>
-          <a:p>
-            <a:r>
-              <a:rPr lang="en-US" sz="800" b="1" smtClean="0">
-                <a:latin typeface="Consolas" pitchFamily="49" charset="0"/>
-              </a:rPr>
-              <a:t>borrow borrow_slot: </a:t>
-            </a:r>
-          </a:p>
-          <a:p>
-            <a:r>
-              <a:rPr lang="en-US" sz="800">
-                <a:latin typeface="Consolas" pitchFamily="49" charset="0"/>
-              </a:rPr>
-              <a:t> </a:t>
-            </a:r>
-            <a:r>
-              <a:rPr lang="en-US" sz="800" smtClean="0">
-                <a:latin typeface="Consolas" pitchFamily="49" charset="0"/>
-              </a:rPr>
-              <a:t>-1 = owner</a:t>
-            </a:r>
-          </a:p>
-          <a:p>
-            <a:r>
-              <a:rPr lang="en-US" sz="800" smtClean="0">
-                <a:latin typeface="Consolas" pitchFamily="49" charset="0"/>
-              </a:rPr>
-              <a:t>  1 = available slot 1</a:t>
-            </a:r>
-          </a:p>
-          <a:p>
-            <a:r>
-              <a:rPr lang="en-US" sz="800" smtClean="0">
-                <a:latin typeface="Consolas" pitchFamily="49" charset="0"/>
-              </a:rPr>
-              <a:t>  2 = available slot 2</a:t>
-            </a:r>
-          </a:p>
-          <a:p>
-            <a:r>
-              <a:rPr lang="en-US" sz="800" smtClean="0">
-                <a:latin typeface="Consolas" pitchFamily="49" charset="0"/>
-              </a:rPr>
-              <a:t>  3 = available slot 3</a:t>
-            </a:r>
-          </a:p>
-          <a:p>
-            <a:r>
-              <a:rPr lang="en-US" sz="800">
-                <a:latin typeface="Consolas" pitchFamily="49" charset="0"/>
-              </a:rPr>
-              <a:t> </a:t>
-            </a:r>
-            <a:r>
-              <a:rPr lang="en-US" sz="800" smtClean="0">
-                <a:latin typeface="Consolas" pitchFamily="49" charset="0"/>
-              </a:rPr>
-              <a:t> ...</a:t>
-            </a:r>
-          </a:p>
-          <a:p>
-            <a:r>
-              <a:rPr lang="en-US" sz="800">
-                <a:latin typeface="Consolas" pitchFamily="49" charset="0"/>
-              </a:rPr>
-              <a:t> </a:t>
-            </a:r>
-            <a:r>
-              <a:rPr lang="en-US" sz="800" smtClean="0">
-                <a:latin typeface="Consolas" pitchFamily="49" charset="0"/>
-              </a:rPr>
-              <a:t> n = available slot n</a:t>
-            </a:r>
-          </a:p>
-        </p:txBody>
-      </p:sp>
-      <p:sp>
-        <p:nvSpPr>
           <p:cNvPr id="35" name="TextBox 34"/>
           <p:cNvSpPr txBox="1"/>
           <p:nvPr/>
@@ -3453,39 +3368,6 @@
           </a:p>
         </p:txBody>
       </p:sp>
-      <p:cxnSp>
-        <p:nvCxnSpPr>
-          <p:cNvPr id="37" name="Straight Arrow Connector 36"/>
-          <p:cNvCxnSpPr/>
-          <p:nvPr/>
-        </p:nvCxnSpPr>
-        <p:spPr>
-          <a:xfrm rot="5400000">
-            <a:off x="8191500" y="2933700"/>
-            <a:ext cx="990600" cy="1588"/>
-          </a:xfrm>
-          <a:prstGeom prst="straightConnector1">
-            <a:avLst/>
-          </a:prstGeom>
-          <a:ln>
-            <a:tailEnd type="arrow"/>
-          </a:ln>
-        </p:spPr>
-        <p:style>
-          <a:lnRef idx="1">
-            <a:schemeClr val="accent1"/>
-          </a:lnRef>
-          <a:fillRef idx="0">
-            <a:schemeClr val="accent1"/>
-          </a:fillRef>
-          <a:effectRef idx="0">
-            <a:schemeClr val="accent1"/>
-          </a:effectRef>
-          <a:fontRef idx="minor">
-            <a:schemeClr val="tx1"/>
-          </a:fontRef>
-        </p:style>
-      </p:cxnSp>
       <p:sp>
         <p:nvSpPr>
           <p:cNvPr id="71" name="TextBox 70"/>
@@ -3494,8 +3376,8 @@
         </p:nvSpPr>
         <p:spPr>
           <a:xfrm>
-            <a:off x="4876800" y="4648200"/>
-            <a:ext cx="1475084" cy="707886"/>
+            <a:off x="6425442" y="3352800"/>
+            <a:ext cx="1194558" cy="461665"/>
           </a:xfrm>
           <a:prstGeom prst="rect">
             <a:avLst/>
@@ -3512,7 +3394,7 @@
               <a:rPr lang="en-US" sz="800" b="1" smtClean="0">
                 <a:latin typeface="Consolas" pitchFamily="49" charset="0"/>
               </a:rPr>
-              <a:t>required_users </a:t>
+              <a:t>gear_users </a:t>
             </a:r>
             <a:r>
               <a:rPr lang="en-US" sz="800" b="1" smtClean="0">
@@ -3530,17 +3412,8 @@
               <a:rPr lang="en-US" sz="800" smtClean="0">
                 <a:latin typeface="Consolas" pitchFamily="49" charset="0"/>
               </a:rPr>
-              <a:t> </a:t>
-            </a:r>
-            <a:r>
-              <a:rPr lang="en-US" sz="800" smtClean="0">
-                <a:latin typeface="Consolas" pitchFamily="49" charset="0"/>
-              </a:rPr>
-              <a:t>i own it</a:t>
-            </a:r>
-            <a:endParaRPr lang="en-US" sz="800" smtClean="0">
-              <a:latin typeface="Consolas" pitchFamily="49" charset="0"/>
-            </a:endParaRPr>
+              <a:t> i own it</a:t>
+            </a:r>
           </a:p>
           <a:p>
             <a:pPr>
@@ -3557,54 +3430,18 @@
               <a:rPr lang="en-US" sz="800" smtClean="0">
                 <a:latin typeface="Consolas" pitchFamily="49" charset="0"/>
               </a:rPr>
-              <a:t>i will buy it</a:t>
+              <a:t>i will buy </a:t>
+            </a:r>
+            <a:r>
+              <a:rPr lang="en-US" sz="800" smtClean="0">
+                <a:latin typeface="Consolas" pitchFamily="49" charset="0"/>
+              </a:rPr>
+              <a:t>it</a:t>
             </a:r>
             <a:endParaRPr lang="en-US" sz="800" smtClean="0">
               <a:latin typeface="Consolas" pitchFamily="49" charset="0"/>
             </a:endParaRPr>
           </a:p>
-          <a:p>
-            <a:pPr>
-              <a:buFontTx/>
-              <a:buChar char="-"/>
-            </a:pPr>
-            <a:r>
-              <a:rPr lang="en-US" sz="800" smtClean="0">
-                <a:latin typeface="Consolas" pitchFamily="49" charset="0"/>
-              </a:rPr>
-              <a:t> </a:t>
-            </a:r>
-            <a:r>
-              <a:rPr lang="en-US" sz="800" smtClean="0">
-                <a:latin typeface="Consolas" pitchFamily="49" charset="0"/>
-              </a:rPr>
-              <a:t>i need to borrow</a:t>
-            </a:r>
-            <a:endParaRPr lang="en-US" sz="800" smtClean="0">
-              <a:latin typeface="Consolas" pitchFamily="49" charset="0"/>
-            </a:endParaRPr>
-          </a:p>
-          <a:p>
-            <a:pPr>
-              <a:buFontTx/>
-              <a:buChar char="-"/>
-            </a:pPr>
-            <a:r>
-              <a:rPr lang="en-US" sz="800" smtClean="0">
-                <a:latin typeface="Consolas" pitchFamily="49" charset="0"/>
-              </a:rPr>
-              <a:t> </a:t>
-            </a:r>
-            <a:r>
-              <a:rPr lang="en-US" sz="800" smtClean="0">
-                <a:latin typeface="Consolas" pitchFamily="49" charset="0"/>
-              </a:rPr>
-              <a:t>being borrowed</a:t>
-            </a:r>
-            <a:endParaRPr lang="en-US" sz="800">
-              <a:latin typeface="Consolas" pitchFamily="49" charset="0"/>
-            </a:endParaRPr>
-          </a:p>
         </p:txBody>
       </p:sp>
       <p:sp>
@@ -3615,8 +3452,8 @@
         </p:nvSpPr>
         <p:spPr>
           <a:xfrm>
-            <a:off x="4532177" y="304800"/>
-            <a:ext cx="801823" cy="461665"/>
+            <a:off x="3052547" y="3657600"/>
+            <a:ext cx="1138453" cy="461665"/>
           </a:xfrm>
           <a:prstGeom prst="rect">
             <a:avLst/>
@@ -3633,7 +3470,13 @@
               <a:rPr lang="en-US" sz="800" b="1" smtClean="0">
                 <a:latin typeface="Consolas" pitchFamily="49" charset="0"/>
               </a:rPr>
-              <a:t>users role:</a:t>
+              <a:t>trips_users </a:t>
+            </a:r>
+            <a:r>
+              <a:rPr lang="en-US" sz="800" b="1" smtClean="0">
+                <a:latin typeface="Consolas" pitchFamily="49" charset="0"/>
+              </a:rPr>
+              <a:t>role:</a:t>
             </a:r>
           </a:p>
           <a:p>
@@ -3669,9 +3512,9 @@
           <p:nvPr/>
         </p:nvCxnSpPr>
         <p:spPr>
-          <a:xfrm rot="16200000" flipV="1">
-            <a:off x="4381500" y="1409700"/>
-            <a:ext cx="1524000" cy="228600"/>
+          <a:xfrm rot="5400000">
+            <a:off x="3466305" y="3390900"/>
+            <a:ext cx="533400" cy="1588"/>
           </a:xfrm>
           <a:prstGeom prst="straightConnector1">
             <a:avLst/>
@@ -3698,13 +3541,15 @@
       <p:cxnSp>
         <p:nvCxnSpPr>
           <p:cNvPr id="82" name="Straight Arrow Connector 81"/>
-          <p:cNvCxnSpPr/>
+          <p:cNvCxnSpPr>
+            <a:endCxn id="26" idx="0"/>
+          </p:cNvCxnSpPr>
           <p:nvPr/>
         </p:nvCxnSpPr>
         <p:spPr>
-          <a:xfrm rot="5400000">
-            <a:off x="6934200" y="2590800"/>
-            <a:ext cx="762000" cy="762000"/>
+          <a:xfrm rot="16200000" flipH="1">
+            <a:off x="8131467" y="2688932"/>
+            <a:ext cx="528935" cy="332669"/>
           </a:xfrm>
           <a:prstGeom prst="straightConnector1">
             <a:avLst/>
@@ -3736,7 +3581,7 @@
         </p:nvSpPr>
         <p:spPr>
           <a:xfrm>
-            <a:off x="3048000" y="5921514"/>
+            <a:off x="5638800" y="5692914"/>
             <a:ext cx="3429000" cy="707886"/>
           </a:xfrm>
           <a:prstGeom prst="rect">
@@ -3841,7 +3686,7 @@
         </p:nvSpPr>
         <p:spPr>
           <a:xfrm>
-            <a:off x="2378483" y="1676400"/>
+            <a:off x="2683283" y="1676400"/>
             <a:ext cx="745717" cy="215444"/>
           </a:xfrm>
           <a:prstGeom prst="rect">
@@ -3885,51 +3730,7 @@
         </p:nvSpPr>
         <p:spPr>
           <a:xfrm>
-            <a:off x="6112283" y="1689556"/>
-            <a:ext cx="745717" cy="215444"/>
-          </a:xfrm>
-          <a:prstGeom prst="rect">
-            <a:avLst/>
-          </a:prstGeom>
-          <a:noFill/>
-        </p:spPr>
-        <p:txBody>
-          <a:bodyPr wrap="none" rtlCol="0">
-            <a:spAutoFit/>
-          </a:bodyPr>
-          <a:lstStyle/>
-          <a:p>
-            <a:r>
-              <a:rPr lang="en-US" sz="800" i="1" smtClean="0">
-                <a:solidFill>
-                  <a:schemeClr val="accent6">
-                    <a:lumMod val="50000"/>
-                  </a:schemeClr>
-                </a:solidFill>
-                <a:latin typeface="Consolas" pitchFamily="49" charset="0"/>
-              </a:rPr>
-              <a:t>join table</a:t>
-            </a:r>
-            <a:endParaRPr lang="en-US" sz="800" i="1">
-              <a:solidFill>
-                <a:schemeClr val="accent6">
-                  <a:lumMod val="50000"/>
-                </a:schemeClr>
-              </a:solidFill>
-              <a:latin typeface="Consolas" pitchFamily="49" charset="0"/>
-            </a:endParaRPr>
-          </a:p>
-        </p:txBody>
-      </p:sp>
-      <p:sp>
-        <p:nvSpPr>
-          <p:cNvPr id="128" name="TextBox 127"/>
-          <p:cNvSpPr txBox="1"/>
-          <p:nvPr/>
-        </p:nvSpPr>
-        <p:spPr>
-          <a:xfrm>
-            <a:off x="4267200" y="3352800"/>
+            <a:off x="5121683" y="1676400"/>
             <a:ext cx="745717" cy="215444"/>
           </a:xfrm>
           <a:prstGeom prst="rect">
@@ -4050,14 +3851,14 @@
       </p:sp>
       <p:sp>
         <p:nvSpPr>
-          <p:cNvPr id="132" name="TextBox 131"/>
+          <p:cNvPr id="26" name="TextBox 25"/>
           <p:cNvSpPr txBox="1"/>
           <p:nvPr/>
         </p:nvSpPr>
         <p:spPr>
           <a:xfrm>
-            <a:off x="7543800" y="4579203"/>
-            <a:ext cx="1538745" cy="830997"/>
+            <a:off x="8077200" y="3119735"/>
+            <a:ext cx="970137" cy="461665"/>
           </a:xfrm>
           <a:prstGeom prst="rect">
             <a:avLst/>
@@ -4065,56 +3866,81 @@
           <a:noFill/>
         </p:spPr>
         <p:txBody>
-          <a:bodyPr wrap="square" rtlCol="0">
+          <a:bodyPr wrap="none" rtlCol="0">
             <a:spAutoFit/>
           </a:bodyPr>
           <a:lstStyle/>
           <a:p>
             <a:r>
               <a:rPr lang="en-US" sz="800" b="1" smtClean="0">
-                <a:solidFill>
-                  <a:schemeClr val="accent5">
-                    <a:lumMod val="75000"/>
-                  </a:schemeClr>
-                </a:solidFill>
                 <a:latin typeface="Consolas" pitchFamily="49" charset="0"/>
               </a:rPr>
-              <a:t>“borrow” table</a:t>
-            </a:r>
-          </a:p>
-          <a:p>
-            <a:r>
-              <a:rPr lang="en-US" sz="800" smtClean="0">
-                <a:solidFill>
-                  <a:schemeClr val="accent5">
-                    <a:lumMod val="75000"/>
-                  </a:schemeClr>
-                </a:solidFill>
+              <a:t>gear</a:t>
+            </a:r>
+            <a:r>
+              <a:rPr lang="en-US" sz="800" b="1" smtClean="0">
                 <a:latin typeface="Consolas" pitchFamily="49" charset="0"/>
               </a:rPr>
-              <a:t>this table contains trip equipment, clothes, or food items that are owned by users or can be loaned and borrowed.</a:t>
-            </a:r>
-            <a:endParaRPr lang="en-US" sz="800">
-              <a:solidFill>
-                <a:schemeClr val="accent5">
-                  <a:lumMod val="75000"/>
-                </a:schemeClr>
-              </a:solidFill>
+              <a:t> required:</a:t>
+            </a:r>
+            <a:endParaRPr lang="en-US" sz="800" b="1" smtClean="0">
               <a:latin typeface="Consolas" pitchFamily="49" charset="0"/>
             </a:endParaRPr>
           </a:p>
+          <a:p>
+            <a:pPr>
+              <a:buFontTx/>
+              <a:buChar char="-"/>
+            </a:pPr>
+            <a:r>
+              <a:rPr lang="en-US" sz="800" smtClean="0">
+                <a:latin typeface="Consolas" pitchFamily="49" charset="0"/>
+              </a:rPr>
+              <a:t> </a:t>
+            </a:r>
+            <a:r>
+              <a:rPr lang="en-US" sz="800" smtClean="0">
+                <a:latin typeface="Consolas" pitchFamily="49" charset="0"/>
+              </a:rPr>
+              <a:t>required</a:t>
+            </a:r>
+            <a:endParaRPr lang="en-US" sz="800" smtClean="0">
+              <a:latin typeface="Consolas" pitchFamily="49" charset="0"/>
+            </a:endParaRPr>
+          </a:p>
+          <a:p>
+            <a:pPr>
+              <a:buFontTx/>
+              <a:buChar char="-"/>
+            </a:pPr>
+            <a:r>
+              <a:rPr lang="en-US" sz="800" smtClean="0">
+                <a:latin typeface="Consolas" pitchFamily="49" charset="0"/>
+              </a:rPr>
+              <a:t> </a:t>
+            </a:r>
+            <a:r>
+              <a:rPr lang="en-US" sz="800" smtClean="0">
+                <a:latin typeface="Consolas" pitchFamily="49" charset="0"/>
+              </a:rPr>
+              <a:t>recommended</a:t>
+            </a:r>
+            <a:endParaRPr lang="en-US" sz="800">
+              <a:latin typeface="Consolas" pitchFamily="49" charset="0"/>
+            </a:endParaRPr>
+          </a:p>
         </p:txBody>
       </p:sp>
       <p:cxnSp>
         <p:nvCxnSpPr>
-          <p:cNvPr id="133" name="Straight Arrow Connector 132"/>
+          <p:cNvPr id="39" name="Straight Arrow Connector 38"/>
           <p:cNvCxnSpPr/>
           <p:nvPr/>
         </p:nvCxnSpPr>
         <p:spPr>
           <a:xfrm>
-            <a:off x="4495801" y="4419599"/>
-            <a:ext cx="381001" cy="304803"/>
+            <a:off x="6096000" y="2895600"/>
+            <a:ext cx="533400" cy="457200"/>
           </a:xfrm>
           <a:prstGeom prst="straightConnector1">
             <a:avLst/>
@@ -4140,14 +3966,14 @@
       </p:cxnSp>
       <p:sp>
         <p:nvSpPr>
-          <p:cNvPr id="26" name="TextBox 25"/>
+          <p:cNvPr id="46" name="TextBox 45"/>
           <p:cNvSpPr txBox="1"/>
           <p:nvPr/>
         </p:nvSpPr>
         <p:spPr>
           <a:xfrm>
-            <a:off x="5943600" y="3352800"/>
-            <a:ext cx="1306768" cy="461665"/>
+            <a:off x="113725" y="300335"/>
+            <a:ext cx="2375971" cy="461665"/>
           </a:xfrm>
           <a:prstGeom prst="rect">
             <a:avLst/>
@@ -4161,52 +3987,13 @@
           <a:lstStyle/>
           <a:p>
             <a:r>
-              <a:rPr lang="en-US" sz="800" b="1" smtClean="0">
-                <a:latin typeface="Consolas" pitchFamily="49" charset="0"/>
+              <a:rPr lang="en-US" sz="2400" smtClean="0">
+                <a:latin typeface="+mj-lt"/>
               </a:rPr>
-              <a:t>borrow share_status</a:t>
-            </a:r>
-            <a:r>
-              <a:rPr lang="en-US" sz="800" b="1" smtClean="0">
-                <a:latin typeface="Consolas" pitchFamily="49" charset="0"/>
-              </a:rPr>
-              <a:t>:</a:t>
-            </a:r>
-          </a:p>
-          <a:p>
-            <a:pPr>
-              <a:buFontTx/>
-              <a:buChar char="-"/>
-            </a:pPr>
-            <a:r>
-              <a:rPr lang="en-US" sz="800" smtClean="0">
-                <a:latin typeface="Consolas" pitchFamily="49" charset="0"/>
-              </a:rPr>
-              <a:t> being borrowed</a:t>
-            </a:r>
-            <a:endParaRPr lang="en-US" sz="800" smtClean="0">
-              <a:latin typeface="Consolas" pitchFamily="49" charset="0"/>
-            </a:endParaRPr>
-          </a:p>
-          <a:p>
-            <a:pPr>
-              <a:buFontTx/>
-              <a:buChar char="-"/>
-            </a:pPr>
-            <a:r>
-              <a:rPr lang="en-US" sz="800" smtClean="0">
-                <a:latin typeface="Consolas" pitchFamily="49" charset="0"/>
-              </a:rPr>
-              <a:t> </a:t>
-            </a:r>
-            <a:r>
-              <a:rPr lang="en-US" sz="800" smtClean="0">
-                <a:latin typeface="Consolas" pitchFamily="49" charset="0"/>
-              </a:rPr>
-              <a:t>not being borrowed</a:t>
-            </a:r>
-            <a:endParaRPr lang="en-US" sz="800">
-              <a:latin typeface="Consolas" pitchFamily="49" charset="0"/>
+              <a:t>MariaDB Schema</a:t>
+            </a:r>
+            <a:endParaRPr lang="en-US" sz="2400">
+              <a:latin typeface="+mj-lt"/>
             </a:endParaRPr>
           </a:p>
         </p:txBody>

</xml_diff>